<commit_message>
Almost python data structures
</commit_message>
<xml_diff>
--- a/doc/Figures/TEMP/Array.pptx
+++ b/doc/Figures/TEMP/Array.pptx
@@ -262,7 +262,7 @@
           <a:p>
             <a:fld id="{4FC12698-76B1-40BC-8C40-C10BAEBAE8AD}" type="datetimeFigureOut">
               <a:rPr lang="en-GB" smtClean="0"/>
-              <a:t>24/10/2021</a:t>
+              <a:t>30/08/2022</a:t>
             </a:fld>
             <a:endParaRPr lang="en-GB"/>
           </a:p>
@@ -462,7 +462,7 @@
           <a:p>
             <a:fld id="{4FC12698-76B1-40BC-8C40-C10BAEBAE8AD}" type="datetimeFigureOut">
               <a:rPr lang="en-GB" smtClean="0"/>
-              <a:t>24/10/2021</a:t>
+              <a:t>30/08/2022</a:t>
             </a:fld>
             <a:endParaRPr lang="en-GB"/>
           </a:p>
@@ -672,7 +672,7 @@
           <a:p>
             <a:fld id="{4FC12698-76B1-40BC-8C40-C10BAEBAE8AD}" type="datetimeFigureOut">
               <a:rPr lang="en-GB" smtClean="0"/>
-              <a:t>24/10/2021</a:t>
+              <a:t>30/08/2022</a:t>
             </a:fld>
             <a:endParaRPr lang="en-GB"/>
           </a:p>
@@ -872,7 +872,7 @@
           <a:p>
             <a:fld id="{4FC12698-76B1-40BC-8C40-C10BAEBAE8AD}" type="datetimeFigureOut">
               <a:rPr lang="en-GB" smtClean="0"/>
-              <a:t>24/10/2021</a:t>
+              <a:t>30/08/2022</a:t>
             </a:fld>
             <a:endParaRPr lang="en-GB"/>
           </a:p>
@@ -1148,7 +1148,7 @@
           <a:p>
             <a:fld id="{4FC12698-76B1-40BC-8C40-C10BAEBAE8AD}" type="datetimeFigureOut">
               <a:rPr lang="en-GB" smtClean="0"/>
-              <a:t>24/10/2021</a:t>
+              <a:t>30/08/2022</a:t>
             </a:fld>
             <a:endParaRPr lang="en-GB"/>
           </a:p>
@@ -1416,7 +1416,7 @@
           <a:p>
             <a:fld id="{4FC12698-76B1-40BC-8C40-C10BAEBAE8AD}" type="datetimeFigureOut">
               <a:rPr lang="en-GB" smtClean="0"/>
-              <a:t>24/10/2021</a:t>
+              <a:t>30/08/2022</a:t>
             </a:fld>
             <a:endParaRPr lang="en-GB"/>
           </a:p>
@@ -1831,7 +1831,7 @@
           <a:p>
             <a:fld id="{4FC12698-76B1-40BC-8C40-C10BAEBAE8AD}" type="datetimeFigureOut">
               <a:rPr lang="en-GB" smtClean="0"/>
-              <a:t>24/10/2021</a:t>
+              <a:t>30/08/2022</a:t>
             </a:fld>
             <a:endParaRPr lang="en-GB"/>
           </a:p>
@@ -1973,7 +1973,7 @@
           <a:p>
             <a:fld id="{4FC12698-76B1-40BC-8C40-C10BAEBAE8AD}" type="datetimeFigureOut">
               <a:rPr lang="en-GB" smtClean="0"/>
-              <a:t>24/10/2021</a:t>
+              <a:t>30/08/2022</a:t>
             </a:fld>
             <a:endParaRPr lang="en-GB"/>
           </a:p>
@@ -2086,7 +2086,7 @@
           <a:p>
             <a:fld id="{4FC12698-76B1-40BC-8C40-C10BAEBAE8AD}" type="datetimeFigureOut">
               <a:rPr lang="en-GB" smtClean="0"/>
-              <a:t>24/10/2021</a:t>
+              <a:t>30/08/2022</a:t>
             </a:fld>
             <a:endParaRPr lang="en-GB"/>
           </a:p>
@@ -2399,7 +2399,7 @@
           <a:p>
             <a:fld id="{4FC12698-76B1-40BC-8C40-C10BAEBAE8AD}" type="datetimeFigureOut">
               <a:rPr lang="en-GB" smtClean="0"/>
-              <a:t>24/10/2021</a:t>
+              <a:t>30/08/2022</a:t>
             </a:fld>
             <a:endParaRPr lang="en-GB"/>
           </a:p>
@@ -2688,7 +2688,7 @@
           <a:p>
             <a:fld id="{4FC12698-76B1-40BC-8C40-C10BAEBAE8AD}" type="datetimeFigureOut">
               <a:rPr lang="en-GB" smtClean="0"/>
-              <a:t>24/10/2021</a:t>
+              <a:t>30/08/2022</a:t>
             </a:fld>
             <a:endParaRPr lang="en-GB"/>
           </a:p>
@@ -2931,7 +2931,7 @@
           <a:p>
             <a:fld id="{4FC12698-76B1-40BC-8C40-C10BAEBAE8AD}" type="datetimeFigureOut">
               <a:rPr lang="en-GB" smtClean="0"/>
-              <a:t>24/10/2021</a:t>
+              <a:t>30/08/2022</a:t>
             </a:fld>
             <a:endParaRPr lang="en-GB"/>
           </a:p>
@@ -3348,8 +3348,8 @@
           <a:chExt cx="0" cy="0"/>
         </a:xfrm>
       </p:grpSpPr>
-      <mc:AlternateContent xmlns:mc="http://schemas.openxmlformats.org/markup-compatibility/2006" xmlns:a14="http://schemas.microsoft.com/office/drawing/2010/main">
-        <mc:Choice Requires="a14">
+      <mc:AlternateContent xmlns:mc="http://schemas.openxmlformats.org/markup-compatibility/2006">
+        <mc:Choice xmlns:a14="http://schemas.microsoft.com/office/drawing/2010/main" Requires="a14">
           <p:sp>
             <p:nvSpPr>
               <p:cNvPr id="4" name="CuadroTexto 3">
@@ -3398,7 +3398,7 @@
                             <a:rPr lang="es-ES" b="0" i="1" smtClean="0">
                               <a:latin typeface="Cambria Math" panose="02040503050406030204" pitchFamily="18" charset="0"/>
                             </a:rPr>
-                            <m:t>𝐴</m:t>
+                            <m:t>𝐶</m:t>
                           </m:r>
                         </m:e>
                         <m:sub>
@@ -3486,7 +3486,7 @@
                                             <a:rPr lang="es-ES" b="0" i="1" smtClean="0">
                                               <a:latin typeface="Cambria Math" panose="02040503050406030204" pitchFamily="18" charset="0"/>
                                             </a:rPr>
-                                            <m:t>𝑎</m:t>
+                                            <m:t>𝑐</m:t>
                                           </m:r>
                                         </m:e>
                                         <m:sub>
@@ -3513,7 +3513,7 @@
                                             <a:rPr lang="es-ES" b="0" i="1" smtClean="0">
                                               <a:latin typeface="Cambria Math" panose="02040503050406030204" pitchFamily="18" charset="0"/>
                                             </a:rPr>
-                                            <m:t>𝑎</m:t>
+                                            <m:t>𝑐</m:t>
                                           </m:r>
                                         </m:e>
                                         <m:sub>
@@ -3542,7 +3542,7 @@
                                             <a:rPr lang="es-ES" b="0" i="1" smtClean="0">
                                               <a:latin typeface="Cambria Math" panose="02040503050406030204" pitchFamily="18" charset="0"/>
                                             </a:rPr>
-                                            <m:t>𝑎</m:t>
+                                            <m:t>𝑐</m:t>
                                           </m:r>
                                         </m:e>
                                         <m:sub>
@@ -3569,7 +3569,7 @@
                                             <a:rPr lang="es-ES" b="0" i="1" smtClean="0">
                                               <a:latin typeface="Cambria Math" panose="02040503050406030204" pitchFamily="18" charset="0"/>
                                             </a:rPr>
-                                            <m:t>𝑎</m:t>
+                                            <m:t>𝑐</m:t>
                                           </m:r>
                                         </m:e>
                                         <m:sub>
@@ -3598,7 +3598,7 @@
                                             <a:rPr lang="es-ES" b="0" i="1" smtClean="0">
                                               <a:latin typeface="Cambria Math" panose="02040503050406030204" pitchFamily="18" charset="0"/>
                                             </a:rPr>
-                                            <m:t>𝑎</m:t>
+                                            <m:t>𝑐</m:t>
                                           </m:r>
                                         </m:e>
                                         <m:sub>
@@ -3625,7 +3625,7 @@
                                             <a:rPr lang="es-ES" b="0" i="1" smtClean="0">
                                               <a:latin typeface="Cambria Math" panose="02040503050406030204" pitchFamily="18" charset="0"/>
                                             </a:rPr>
-                                            <m:t>𝑎</m:t>
+                                            <m:t>𝑐</m:t>
                                           </m:r>
                                         </m:e>
                                         <m:sub>
@@ -3673,7 +3673,7 @@
                                             <a:rPr lang="es-ES" b="0" i="1" smtClean="0">
                                               <a:latin typeface="Cambria Math" panose="02040503050406030204" pitchFamily="18" charset="0"/>
                                             </a:rPr>
-                                            <m:t>𝑎</m:t>
+                                            <m:t>𝑐</m:t>
                                           </m:r>
                                         </m:e>
                                         <m:sub>
@@ -3700,7 +3700,7 @@
                                             <a:rPr lang="es-ES" b="0" i="1" smtClean="0">
                                               <a:latin typeface="Cambria Math" panose="02040503050406030204" pitchFamily="18" charset="0"/>
                                             </a:rPr>
-                                            <m:t>𝑎</m:t>
+                                            <m:t>𝑐</m:t>
                                           </m:r>
                                         </m:e>
                                         <m:sub>
@@ -3729,7 +3729,7 @@
                                             <a:rPr lang="es-ES" b="0" i="1" smtClean="0">
                                               <a:latin typeface="Cambria Math" panose="02040503050406030204" pitchFamily="18" charset="0"/>
                                             </a:rPr>
-                                            <m:t>𝑎</m:t>
+                                            <m:t>𝑐</m:t>
                                           </m:r>
                                         </m:e>
                                         <m:sub>
@@ -3756,7 +3756,7 @@
                                             <a:rPr lang="es-ES" b="0" i="1" smtClean="0">
                                               <a:latin typeface="Cambria Math" panose="02040503050406030204" pitchFamily="18" charset="0"/>
                                             </a:rPr>
-                                            <m:t>𝑎</m:t>
+                                            <m:t>𝑐</m:t>
                                           </m:r>
                                         </m:e>
                                         <m:sub>
@@ -3785,7 +3785,7 @@
                                             <a:rPr lang="es-ES" b="0" i="1" smtClean="0">
                                               <a:latin typeface="Cambria Math" panose="02040503050406030204" pitchFamily="18" charset="0"/>
                                             </a:rPr>
-                                            <m:t>𝑎</m:t>
+                                            <m:t>𝑐</m:t>
                                           </m:r>
                                         </m:e>
                                         <m:sub>
@@ -3812,7 +3812,7 @@
                                             <a:rPr lang="es-ES" b="0" i="1" smtClean="0">
                                               <a:latin typeface="Cambria Math" panose="02040503050406030204" pitchFamily="18" charset="0"/>
                                             </a:rPr>
-                                            <m:t>𝑎</m:t>
+                                            <m:t>𝑐</m:t>
                                           </m:r>
                                         </m:e>
                                         <m:sub>
@@ -3862,7 +3862,7 @@
                                             <a:rPr lang="es-ES" b="0" i="1" smtClean="0">
                                               <a:latin typeface="Cambria Math" panose="02040503050406030204" pitchFamily="18" charset="0"/>
                                             </a:rPr>
-                                            <m:t>𝑎</m:t>
+                                            <m:t>𝑐</m:t>
                                           </m:r>
                                         </m:e>
                                         <m:sub>
@@ -3889,7 +3889,7 @@
                                             <a:rPr lang="es-ES" b="0" i="1" smtClean="0">
                                               <a:latin typeface="Cambria Math" panose="02040503050406030204" pitchFamily="18" charset="0"/>
                                             </a:rPr>
-                                            <m:t>𝑎</m:t>
+                                            <m:t>𝑐</m:t>
                                           </m:r>
                                         </m:e>
                                         <m:sub>
@@ -3918,7 +3918,7 @@
                                             <a:rPr lang="es-ES" b="0" i="1" smtClean="0">
                                               <a:latin typeface="Cambria Math" panose="02040503050406030204" pitchFamily="18" charset="0"/>
                                             </a:rPr>
-                                            <m:t>𝑎</m:t>
+                                            <m:t>𝑐</m:t>
                                           </m:r>
                                         </m:e>
                                         <m:sub>
@@ -3945,7 +3945,7 @@
                                             <a:rPr lang="es-ES" b="0" i="1" smtClean="0">
                                               <a:latin typeface="Cambria Math" panose="02040503050406030204" pitchFamily="18" charset="0"/>
                                             </a:rPr>
-                                            <m:t>𝑎</m:t>
+                                            <m:t>𝑐</m:t>
                                           </m:r>
                                         </m:e>
                                         <m:sub>
@@ -3993,7 +3993,7 @@
                                             <a:rPr lang="es-ES" b="0" i="1" smtClean="0">
                                               <a:latin typeface="Cambria Math" panose="02040503050406030204" pitchFamily="18" charset="0"/>
                                             </a:rPr>
-                                            <m:t>𝑎</m:t>
+                                            <m:t>𝑐</m:t>
                                           </m:r>
                                         </m:e>
                                         <m:sub>
@@ -4020,7 +4020,7 @@
                                             <a:rPr lang="es-ES" b="0" i="1" smtClean="0">
                                               <a:latin typeface="Cambria Math" panose="02040503050406030204" pitchFamily="18" charset="0"/>
                                             </a:rPr>
-                                            <m:t>𝑎</m:t>
+                                            <m:t>𝑐</m:t>
                                           </m:r>
                                         </m:e>
                                         <m:sub>
@@ -4049,7 +4049,7 @@
                                             <a:rPr lang="es-ES" b="0" i="1" smtClean="0">
                                               <a:latin typeface="Cambria Math" panose="02040503050406030204" pitchFamily="18" charset="0"/>
                                             </a:rPr>
-                                            <m:t>𝑎</m:t>
+                                            <m:t>𝑐</m:t>
                                           </m:r>
                                         </m:e>
                                         <m:sub>
@@ -4076,7 +4076,7 @@
                                             <a:rPr lang="es-ES" b="0" i="1" smtClean="0">
                                               <a:latin typeface="Cambria Math" panose="02040503050406030204" pitchFamily="18" charset="0"/>
                                             </a:rPr>
-                                            <m:t>𝑎</m:t>
+                                            <m:t>𝑐</m:t>
                                           </m:r>
                                         </m:e>
                                         <m:sub>
@@ -4104,7 +4104,7 @@
             </p:txBody>
           </p:sp>
         </mc:Choice>
-        <mc:Fallback xmlns="">
+        <mc:Fallback>
           <p:sp>
             <p:nvSpPr>
               <p:cNvPr id="4" name="CuadroTexto 3">
@@ -4139,7 +4139,7 @@
               <a:lstStyle/>
               <a:p>
                 <a:r>
-                  <a:rPr lang="en-GB">
+                  <a:rPr lang="es-ES">
                     <a:noFill/>
                   </a:rPr>
                   <a:t> </a:t>
@@ -5037,7 +5037,7 @@
               <a:rPr lang="es-ES" sz="1400" dirty="0">
                 <a:latin typeface="Consolas" panose="020B0609020204030204" pitchFamily="49" charset="0"/>
               </a:rPr>
-              <a:t>A(:,2)</a:t>
+              <a:t>C(:,2)</a:t>
             </a:r>
             <a:endParaRPr lang="en-GB" sz="1400" dirty="0">
               <a:latin typeface="Consolas" panose="020B0609020204030204" pitchFamily="49" charset="0"/>
@@ -5132,7 +5132,7 @@
               <a:rPr lang="es-ES" sz="1400" dirty="0">
                 <a:latin typeface="Consolas" panose="020B0609020204030204" pitchFamily="49" charset="0"/>
               </a:rPr>
-              <a:t>A(2:3,3:4)</a:t>
+              <a:t>C(2:3,3:4)</a:t>
             </a:r>
             <a:endParaRPr lang="en-GB" sz="1400" dirty="0">
               <a:latin typeface="Consolas" panose="020B0609020204030204" pitchFamily="49" charset="0"/>
@@ -5172,7 +5172,7 @@
               <a:rPr lang="es-ES" sz="1400" dirty="0">
                 <a:latin typeface="Consolas" panose="020B0609020204030204" pitchFamily="49" charset="0"/>
               </a:rPr>
-              <a:t>real :: A(5,4)</a:t>
+              <a:t>real :: C(5,4)</a:t>
             </a:r>
             <a:endParaRPr lang="en-GB" sz="1400" dirty="0">
               <a:latin typeface="Consolas" panose="020B0609020204030204" pitchFamily="49" charset="0"/>

</xml_diff>